<commit_message>
Modifier l'aspect de la présentation
</commit_message>
<xml_diff>
--- a/Documentation/Présentation/JGR_AJD_Finder.pptx
+++ b/Documentation/Présentation/JGR_AJD_Finder.pptx
@@ -279,7 +279,7 @@
           <a:p>
             <a:fld id="{27E0E5C5-B04B-1E44-8B86-EFD3441998B1}" type="datetimeFigureOut">
               <a:rPr lang="fr-FR" smtClean="0"/>
-              <a:t>19/12/2018</a:t>
+              <a:t>20/12/2018</a:t>
             </a:fld>
             <a:endParaRPr lang="fr-FR"/>
           </a:p>
@@ -581,7 +581,11 @@
             </a:r>
             <a:r>
               <a:rPr lang="fr-CH" dirty="0"/>
-              <a:t> : 3-4-9-10-11-12-14</a:t>
+              <a:t> : </a:t>
+            </a:r>
+            <a:r>
+              <a:rPr lang="fr-CH" dirty="0" smtClean="0"/>
+              <a:t>3-4-9-10-12-14</a:t>
             </a:r>
             <a:r>
               <a:rPr lang="fr-FR" dirty="0"/>
@@ -9081,7 +9085,7 @@
           <a:p>
             <a:fld id="{ABC320FA-D7E0-4BC4-B732-49E9897680AC}" type="datetimeFigureOut">
               <a:rPr lang="fr-CH" smtClean="0"/>
-              <a:t>19.12.18</a:t>
+              <a:t>20.12.2018</a:t>
             </a:fld>
             <a:endParaRPr lang="fr-CH"/>
           </a:p>
@@ -9176,7 +9180,7 @@
           <a:p>
             <a:fld id="{ABC320FA-D7E0-4BC4-B732-49E9897680AC}" type="datetimeFigureOut">
               <a:rPr lang="fr-CH" smtClean="0"/>
-              <a:t>19.12.18</a:t>
+              <a:t>20.12.2018</a:t>
             </a:fld>
             <a:endParaRPr lang="fr-CH"/>
           </a:p>
@@ -19467,7 +19471,7 @@
           <a:p>
             <a:fld id="{8E77ADC1-6FC9-463B-95FF-779DD7154547}" type="datetimeFigureOut">
               <a:rPr lang="fr-FR" smtClean="0"/>
-              <a:t>19/12/2018</a:t>
+              <a:t>20/12/2018</a:t>
             </a:fld>
             <a:endParaRPr lang="fr-FR"/>
           </a:p>
@@ -19988,6 +19992,13 @@
   <p:clrMapOvr>
     <a:masterClrMapping/>
   </p:clrMapOvr>
+  <p:timing>
+    <p:tnLst>
+      <p:par>
+        <p:cTn id="1" dur="indefinite" restart="never" nodeType="tmRoot"/>
+      </p:par>
+    </p:tnLst>
+  </p:timing>
 </p:sld>
 </file>
 
@@ -20048,6 +20059,13 @@
   <p:clrMapOvr>
     <a:masterClrMapping/>
   </p:clrMapOvr>
+  <p:timing>
+    <p:tnLst>
+      <p:par>
+        <p:cTn id="1" dur="indefinite" restart="never" nodeType="tmRoot"/>
+      </p:par>
+    </p:tnLst>
+  </p:timing>
 </p:sld>
 </file>
 
@@ -21229,9 +21247,9 @@
         <p:grpSpPr>
           <a:xfrm>
             <a:off x="2088667" y="3173801"/>
-            <a:ext cx="720000" cy="1301043"/>
+            <a:ext cx="720000" cy="1291425"/>
             <a:chOff x="2088667" y="3173801"/>
-            <a:chExt cx="720000" cy="1301043"/>
+            <a:chExt cx="720000" cy="1291425"/>
           </a:xfrm>
         </p:grpSpPr>
         <p:grpSp>
@@ -22190,8 +22208,8 @@
           </p:nvSpPr>
           <p:spPr>
             <a:xfrm>
-              <a:off x="2270252" y="4037801"/>
-              <a:ext cx="356829" cy="437043"/>
+              <a:off x="2245406" y="4037801"/>
+              <a:ext cx="406522" cy="427425"/>
             </a:xfrm>
             <a:prstGeom prst="rect">
               <a:avLst/>
@@ -22214,7 +22232,14 @@
                   <a:latin typeface="Segoe UI Light" panose="020B0502040204020203" pitchFamily="34" charset="0"/>
                   <a:cs typeface="Segoe UI Light" panose="020B0502040204020203" pitchFamily="34" charset="0"/>
                 </a:rPr>
-                <a:t>C#</a:t>
+                <a:t>C</a:t>
+              </a:r>
+              <a:r>
+                <a:rPr lang="fr-FR" sz="2000" dirty="0" smtClean="0">
+                  <a:latin typeface="Segoe UI Light" panose="020B0502040204020203" pitchFamily="34" charset="0"/>
+                  <a:cs typeface="Segoe UI Light" panose="020B0502040204020203" pitchFamily="34" charset="0"/>
+                </a:rPr>
+                <a:t>#</a:t>
               </a:r>
             </a:p>
           </p:txBody>
@@ -22473,7 +22498,7 @@
         </p:nvGrpSpPr>
         <p:grpSpPr>
           <a:xfrm>
-            <a:off x="1081310" y="3355910"/>
+            <a:off x="946519" y="3173801"/>
             <a:ext cx="3010568" cy="1686696"/>
             <a:chOff x="1081310" y="3355910"/>
             <a:chExt cx="3010568" cy="1686696"/>
@@ -22918,7 +22943,7 @@
         </p:nvGrpSpPr>
         <p:grpSpPr>
           <a:xfrm>
-            <a:off x="4821656" y="3355911"/>
+            <a:off x="4836522" y="3173802"/>
             <a:ext cx="2063706" cy="1686694"/>
             <a:chOff x="4820909" y="3355910"/>
             <a:chExt cx="2063706" cy="1686694"/>
@@ -23363,7 +23388,7 @@
         </p:nvGrpSpPr>
         <p:grpSpPr>
           <a:xfrm>
-            <a:off x="8087078" y="3355911"/>
+            <a:off x="8256230" y="3173801"/>
             <a:ext cx="2063706" cy="1686695"/>
             <a:chOff x="8087078" y="3355910"/>
             <a:chExt cx="2063706" cy="1686695"/>
@@ -27434,10 +27459,10 @@
         </p:nvGrpSpPr>
         <p:grpSpPr>
           <a:xfrm>
-            <a:off x="1967246" y="3677150"/>
-            <a:ext cx="829714" cy="1325043"/>
-            <a:chOff x="1967246" y="3517638"/>
-            <a:chExt cx="829714" cy="1325043"/>
+            <a:off x="2378270" y="3332946"/>
+            <a:ext cx="1066100" cy="1349665"/>
+            <a:chOff x="1878928" y="3517638"/>
+            <a:chExt cx="1066100" cy="1349665"/>
           </a:xfrm>
         </p:grpSpPr>
         <p:grpSp>
@@ -28412,8 +28437,8 @@
           </p:nvSpPr>
           <p:spPr>
             <a:xfrm>
-              <a:off x="1967246" y="4405638"/>
-              <a:ext cx="829714" cy="437043"/>
+              <a:off x="1878928" y="4405638"/>
+              <a:ext cx="1066100" cy="461665"/>
             </a:xfrm>
             <a:prstGeom prst="rect">
               <a:avLst/>
@@ -28456,7 +28481,7 @@
         </p:nvGrpSpPr>
         <p:grpSpPr>
           <a:xfrm>
-            <a:off x="5257870" y="3739338"/>
+            <a:off x="5768571" y="3443662"/>
             <a:ext cx="946071" cy="1200667"/>
             <a:chOff x="5257870" y="3642013"/>
             <a:chExt cx="946071" cy="1200667"/>
@@ -29529,7 +29554,7 @@
         </p:nvGrpSpPr>
         <p:grpSpPr>
           <a:xfrm>
-            <a:off x="8764866" y="3467330"/>
+            <a:off x="8688053" y="3262609"/>
             <a:ext cx="1745350" cy="1744682"/>
             <a:chOff x="8764866" y="3467330"/>
             <a:chExt cx="1745350" cy="1744682"/>
@@ -30856,7 +30881,7 @@
         </p:nvGrpSpPr>
         <p:grpSpPr>
           <a:xfrm>
-            <a:off x="1644959" y="3124888"/>
+            <a:off x="1644959" y="3125260"/>
             <a:ext cx="2368725" cy="1522060"/>
             <a:chOff x="1187759" y="3336761"/>
             <a:chExt cx="2368725" cy="1522060"/>
@@ -32628,7 +32653,7 @@
         </p:nvGrpSpPr>
         <p:grpSpPr>
           <a:xfrm>
-            <a:off x="8469531" y="3130146"/>
+            <a:off x="8469531" y="3135775"/>
             <a:ext cx="1963872" cy="1511545"/>
             <a:chOff x="8012331" y="3347274"/>
             <a:chExt cx="1963872" cy="1511545"/>
@@ -34094,6 +34119,13 @@
   <p:clrMapOvr>
     <a:masterClrMapping/>
   </p:clrMapOvr>
+  <p:timing>
+    <p:tnLst>
+      <p:par>
+        <p:cTn id="1" dur="indefinite" restart="never" nodeType="tmRoot"/>
+      </p:par>
+    </p:tnLst>
+  </p:timing>
 </p:sld>
 </file>
 
@@ -34337,6 +34369,13 @@
   <p:clrMapOvr>
     <a:masterClrMapping/>
   </p:clrMapOvr>
+  <p:timing>
+    <p:tnLst>
+      <p:par>
+        <p:cTn id="1" dur="indefinite" restart="never" nodeType="tmRoot"/>
+      </p:par>
+    </p:tnLst>
+  </p:timing>
 </p:sld>
 </file>
 
@@ -34589,6 +34628,13 @@
   <p:clrMapOvr>
     <a:masterClrMapping/>
   </p:clrMapOvr>
+  <p:timing>
+    <p:tnLst>
+      <p:par>
+        <p:cTn id="1" dur="indefinite" restart="never" nodeType="tmRoot"/>
+      </p:par>
+    </p:tnLst>
+  </p:timing>
 </p:sld>
 </file>
 
@@ -41557,6 +41603,13 @@
   <p:clrMapOvr>
     <a:masterClrMapping/>
   </p:clrMapOvr>
+  <p:timing>
+    <p:tnLst>
+      <p:par>
+        <p:cTn id="1" dur="indefinite" restart="never" nodeType="tmRoot"/>
+      </p:par>
+    </p:tnLst>
+  </p:timing>
 </p:sld>
 </file>
 
@@ -42179,6 +42232,13 @@
   <p:clrMapOvr>
     <a:masterClrMapping/>
   </p:clrMapOvr>
+  <p:timing>
+    <p:tnLst>
+      <p:par>
+        <p:cTn id="1" dur="indefinite" restart="never" nodeType="tmRoot"/>
+      </p:par>
+    </p:tnLst>
+  </p:timing>
 </p:sld>
 </file>
 
@@ -43444,6 +43504,13 @@
   <p:clrMapOvr>
     <a:masterClrMapping/>
   </p:clrMapOvr>
+  <p:timing>
+    <p:tnLst>
+      <p:par>
+        <p:cTn id="1" dur="indefinite" restart="never" nodeType="tmRoot"/>
+      </p:par>
+    </p:tnLst>
+  </p:timing>
 </p:sld>
 </file>
 

</xml_diff>